<commit_message>
ultima aula desse projeto
</commit_message>
<xml_diff>
--- a/Documentacao/ModelagemSistema_TemplateInicial.pptx
+++ b/Documentacao/ModelagemSistema_TemplateInicial.pptx
@@ -222,7 +222,7 @@
           <a:p>
             <a:fld id="{93DDA81E-B6DD-4CA0-9C2D-B0C27B95DC2C}" type="datetimeFigureOut">
               <a:rPr lang="pt-BR" smtClean="0"/>
-              <a:t>13/02/2025</a:t>
+              <a:t>14/02/2025</a:t>
             </a:fld>
             <a:endParaRPr lang="pt-BR"/>
           </a:p>
@@ -3291,7 +3291,7 @@
           <a:p>
             <a:fld id="{C128FA71-3A18-48C0-980F-4B68F7F63042}" type="datetime1">
               <a:rPr lang="en-US" smtClean="0"/>
-              <a:t>2/13/2025</a:t>
+              <a:t>2/14/2025</a:t>
             </a:fld>
             <a:endParaRPr lang="en-US"/>
           </a:p>
@@ -3499,7 +3499,7 @@
           <a:p>
             <a:fld id="{7104EDB3-C0E8-45F8-9E1D-1B6C8D1880C0}" type="datetime1">
               <a:rPr lang="en-US" smtClean="0"/>
-              <a:t>2/13/2025</a:t>
+              <a:t>2/14/2025</a:t>
             </a:fld>
             <a:endParaRPr lang="en-US"/>
           </a:p>
@@ -3709,7 +3709,7 @@
           <a:p>
             <a:fld id="{9CF0EC4B-54ED-4041-B552-9BA760FA3DBA}" type="datetime1">
               <a:rPr lang="en-US" smtClean="0"/>
-              <a:t>2/13/2025</a:t>
+              <a:t>2/14/2025</a:t>
             </a:fld>
             <a:endParaRPr lang="en-US"/>
           </a:p>
@@ -3907,7 +3907,7 @@
           <a:p>
             <a:fld id="{51C1210E-201E-4473-82AC-2466F5386C38}" type="datetime1">
               <a:rPr lang="en-US" smtClean="0"/>
-              <a:t>2/13/2025</a:t>
+              <a:t>2/14/2025</a:t>
             </a:fld>
             <a:endParaRPr lang="en-US"/>
           </a:p>
@@ -4185,7 +4185,7 @@
           <a:p>
             <a:fld id="{B01EA198-6CAB-4B8F-B93F-1F9C8C4B6CE7}" type="datetime1">
               <a:rPr lang="en-US" smtClean="0"/>
-              <a:t>2/13/2025</a:t>
+              <a:t>2/14/2025</a:t>
             </a:fld>
             <a:endParaRPr lang="en-US"/>
           </a:p>
@@ -4457,7 +4457,7 @@
           <a:p>
             <a:fld id="{CA06041F-4525-44D5-AA4F-332294BF1F56}" type="datetime1">
               <a:rPr lang="en-US" smtClean="0"/>
-              <a:t>2/13/2025</a:t>
+              <a:t>2/14/2025</a:t>
             </a:fld>
             <a:endParaRPr lang="en-US"/>
           </a:p>
@@ -4881,7 +4881,7 @@
           <a:p>
             <a:fld id="{F9557091-BBDF-4EB9-BA6B-2BB67AC4FC0F}" type="datetime1">
               <a:rPr lang="en-US" smtClean="0"/>
-              <a:t>2/13/2025</a:t>
+              <a:t>2/14/2025</a:t>
             </a:fld>
             <a:endParaRPr lang="en-US"/>
           </a:p>
@@ -5022,7 +5022,7 @@
           <a:p>
             <a:fld id="{2D6B226B-77A6-410C-9796-083F278E0125}" type="datetime1">
               <a:rPr lang="en-US" smtClean="0"/>
-              <a:t>2/13/2025</a:t>
+              <a:t>2/14/2025</a:t>
             </a:fld>
             <a:endParaRPr lang="en-US"/>
           </a:p>
@@ -5135,7 +5135,7 @@
           <a:p>
             <a:fld id="{A23A578B-D289-4C40-8593-3D356C49DA58}" type="datetime1">
               <a:rPr lang="en-US" smtClean="0"/>
-              <a:t>2/13/2025</a:t>
+              <a:t>2/14/2025</a:t>
             </a:fld>
             <a:endParaRPr lang="en-US"/>
           </a:p>
@@ -5454,7 +5454,7 @@
           <a:p>
             <a:fld id="{713DFAE3-14DB-48A7-A80F-80DDB072CE3D}" type="datetime1">
               <a:rPr lang="en-US" smtClean="0"/>
-              <a:t>2/13/2025</a:t>
+              <a:t>2/14/2025</a:t>
             </a:fld>
             <a:endParaRPr lang="en-US"/>
           </a:p>
@@ -5748,7 +5748,7 @@
           <a:p>
             <a:fld id="{92C5EAEF-6478-4102-8F5D-A5FE9FC97ACB}" type="datetime1">
               <a:rPr lang="en-US" smtClean="0"/>
-              <a:t>2/13/2025</a:t>
+              <a:t>2/14/2025</a:t>
             </a:fld>
             <a:endParaRPr lang="en-US"/>
           </a:p>
@@ -5989,7 +5989,7 @@
           <a:p>
             <a:fld id="{67F45AC6-C491-4585-A584-9CE2AF7D5500}" type="datetime1">
               <a:rPr lang="en-US" smtClean="0"/>
-              <a:t>2/13/2025</a:t>
+              <a:t>2/14/2025</a:t>
             </a:fld>
             <a:endParaRPr lang="en-US"/>
           </a:p>
@@ -6419,7 +6419,7 @@
                 <a16:creationId xmlns:a16="http://schemas.microsoft.com/office/drawing/2014/main" id="{6E448DB1-4196-18A6-15DA-C72635C1B11E}"/>
               </a:ext>
               <a:ext uri="{C183D7F6-B498-43B3-948B-1728B52AA6E4}">
-                <adec:decorative xmlns:adec="http://schemas.microsoft.com/office/drawing/2017/decorative" xmlns="" val="1"/>
+                <adec:decorative xmlns="" xmlns:adec="http://schemas.microsoft.com/office/drawing/2017/decorative" val="1"/>
               </a:ext>
             </a:extLst>
           </p:cNvPr>
@@ -6527,7 +6527,7 @@
                 <a16:creationId xmlns:a16="http://schemas.microsoft.com/office/drawing/2014/main" id="{76A10D8F-D463-70E5-239B-17AD65EF433D}"/>
               </a:ext>
               <a:ext uri="{C183D7F6-B498-43B3-948B-1728B52AA6E4}">
-                <adec:decorative xmlns:adec="http://schemas.microsoft.com/office/drawing/2017/decorative" xmlns="" val="1"/>
+                <adec:decorative xmlns="" xmlns:adec="http://schemas.microsoft.com/office/drawing/2017/decorative" val="1"/>
               </a:ext>
             </a:extLst>
           </p:cNvPr>
@@ -6707,8 +6707,13 @@
             <a:pPr algn="l"/>
             <a:r>
               <a:rPr lang="pt-BR" sz="2200" dirty="0"/>
-              <a:t>Nome do Aluno</a:t>
-            </a:r>
+              <a:t>Nome do </a:t>
+            </a:r>
+            <a:r>
+              <a:rPr lang="pt-BR" sz="2200" dirty="0" smtClean="0"/>
+              <a:t>Aluno: Anthony Gabriel</a:t>
+            </a:r>
+            <a:endParaRPr lang="pt-BR" sz="2200" dirty="0"/>
           </a:p>
         </p:txBody>
       </p:sp>
@@ -6988,7 +6993,7 @@
                 <a16:creationId xmlns:a16="http://schemas.microsoft.com/office/drawing/2014/main" id="{74EA76C7-8C08-E029-0E79-750B71C94A62}"/>
               </a:ext>
               <a:ext uri="{C183D7F6-B498-43B3-948B-1728B52AA6E4}">
-                <adec:decorative xmlns:adec="http://schemas.microsoft.com/office/drawing/2017/decorative" xmlns="" val="1"/>
+                <adec:decorative xmlns="" xmlns:adec="http://schemas.microsoft.com/office/drawing/2017/decorative" val="1"/>
               </a:ext>
             </a:extLst>
           </p:cNvPr>
@@ -7127,7 +7132,7 @@
             <p:ph sz="half" idx="2"/>
             <p:extLst>
               <p:ext uri="{E7BDC344-281C-4309-B0C6-D0EE65EED2A8}">
-                <p202:designPr xmlns:p202="http://schemas.microsoft.com/office/powerpoint/2020/02/main" xmlns="">
+                <p202:designPr xmlns="" xmlns:p202="http://schemas.microsoft.com/office/powerpoint/2020/02/main">
                   <p202:designTagLst>
                     <p202:designTag name="ARCH:1:CLS" val="InformationBlock"/>
                     <p202:designTag name="ARCH:1:VSVAR" val="TitledTextBox"/>
@@ -7423,7 +7428,7 @@
                 <a16:creationId xmlns:a16="http://schemas.microsoft.com/office/drawing/2014/main" id="{74EA76C7-8C08-E029-0E79-750B71C94A62}"/>
               </a:ext>
               <a:ext uri="{C183D7F6-B498-43B3-948B-1728B52AA6E4}">
-                <adec:decorative xmlns:adec="http://schemas.microsoft.com/office/drawing/2017/decorative" xmlns="" val="1"/>
+                <adec:decorative xmlns="" xmlns:adec="http://schemas.microsoft.com/office/drawing/2017/decorative" val="1"/>
               </a:ext>
             </a:extLst>
           </p:cNvPr>
@@ -8184,7 +8189,7 @@
                 <a16:creationId xmlns:a16="http://schemas.microsoft.com/office/drawing/2014/main" id="{5E8D3B17-7638-DFD3-18E4-8A6D611749CF}"/>
               </a:ext>
               <a:ext uri="{C183D7F6-B498-43B3-948B-1728B52AA6E4}">
-                <adec:decorative xmlns:adec="http://schemas.microsoft.com/office/drawing/2017/decorative" xmlns="" val="1"/>
+                <adec:decorative xmlns="" xmlns:adec="http://schemas.microsoft.com/office/drawing/2017/decorative" val="1"/>
               </a:ext>
             </a:extLst>
           </p:cNvPr>
@@ -8619,7 +8624,7 @@
                 <a16:creationId xmlns:a16="http://schemas.microsoft.com/office/drawing/2014/main" id="{B8ADE68D-5E75-5D63-4B8C-6BEFCE9D06E3}"/>
               </a:ext>
               <a:ext uri="{C183D7F6-B498-43B3-948B-1728B52AA6E4}">
-                <adec:decorative xmlns:adec="http://schemas.microsoft.com/office/drawing/2017/decorative" xmlns="" val="1"/>
+                <adec:decorative xmlns="" xmlns:adec="http://schemas.microsoft.com/office/drawing/2017/decorative" val="1"/>
               </a:ext>
             </a:extLst>
           </p:cNvPr>
@@ -10346,7 +10351,7 @@
                 <a16:creationId xmlns:a16="http://schemas.microsoft.com/office/drawing/2014/main" id="{8450EF29-A29A-9417-2B09-074C04064425}"/>
               </a:ext>
               <a:ext uri="{C183D7F6-B498-43B3-948B-1728B52AA6E4}">
-                <adec:decorative xmlns:adec="http://schemas.microsoft.com/office/drawing/2017/decorative" xmlns="" val="1"/>
+                <adec:decorative xmlns="" xmlns:adec="http://schemas.microsoft.com/office/drawing/2017/decorative" val="1"/>
               </a:ext>
             </a:extLst>
           </p:cNvPr>
@@ -11003,7 +11008,7 @@
                 <a16:creationId xmlns:a16="http://schemas.microsoft.com/office/drawing/2014/main" id="{8450EF29-A29A-9417-2B09-074C04064425}"/>
               </a:ext>
               <a:ext uri="{C183D7F6-B498-43B3-948B-1728B52AA6E4}">
-                <adec:decorative xmlns:adec="http://schemas.microsoft.com/office/drawing/2017/decorative" xmlns="" val="1"/>
+                <adec:decorative xmlns="" xmlns:adec="http://schemas.microsoft.com/office/drawing/2017/decorative" val="1"/>
               </a:ext>
             </a:extLst>
           </p:cNvPr>
@@ -12795,14 +12800,7 @@
                 <a:latin typeface="Arial" panose="020B0604020202020204" pitchFamily="34" charset="0"/>
                 <a:cs typeface="Arial" panose="020B0604020202020204" pitchFamily="34" charset="0"/>
               </a:rPr>
-              <a:t>Intens</a:t>
-            </a:r>
-            <a:r>
-              <a:rPr lang="pt-BR" sz="1600" dirty="0" err="1" smtClean="0">
-                <a:latin typeface="Arial" panose="020B0604020202020204" pitchFamily="34" charset="0"/>
-                <a:cs typeface="Arial" panose="020B0604020202020204" pitchFamily="34" charset="0"/>
-              </a:rPr>
-              <a:t>Entrada</a:t>
+              <a:t>IntensEntrada</a:t>
             </a:r>
             <a:endParaRPr lang="pt-BR" sz="1600" dirty="0">
               <a:latin typeface="Arial" panose="020B0604020202020204" pitchFamily="34" charset="0"/>
@@ -12941,7 +12939,7 @@
             <p:ph sz="half" idx="2"/>
             <p:extLst>
               <p:ext uri="{D42A27DB-BD31-4B8C-83A1-F6EECF244321}">
-                <p14:modId xmlns:p14="http://schemas.microsoft.com/office/powerpoint/2010/main" val="3080268220"/>
+                <p14:modId xmlns:p14="http://schemas.microsoft.com/office/powerpoint/2010/main" val="766778831"/>
               </p:ext>
             </p:extLst>
           </p:nvPr>
@@ -14159,7 +14157,7 @@
                 <a16:creationId xmlns:a16="http://schemas.microsoft.com/office/drawing/2014/main" id="{5E8D3B17-7638-DFD3-18E4-8A6D611749CF}"/>
               </a:ext>
               <a:ext uri="{C183D7F6-B498-43B3-948B-1728B52AA6E4}">
-                <adec:decorative xmlns:adec="http://schemas.microsoft.com/office/drawing/2017/decorative" xmlns="" val="1"/>
+                <adec:decorative xmlns="" xmlns:adec="http://schemas.microsoft.com/office/drawing/2017/decorative" val="1"/>
               </a:ext>
             </a:extLst>
           </p:cNvPr>
@@ -14368,7 +14366,7 @@
             <p:ph sz="half" idx="2"/>
             <p:extLst>
               <p:ext uri="{E7BDC344-281C-4309-B0C6-D0EE65EED2A8}">
-                <p202:designPr xmlns:p202="http://schemas.microsoft.com/office/powerpoint/2020/02/main" xmlns="">
+                <p202:designPr xmlns="" xmlns:p202="http://schemas.microsoft.com/office/powerpoint/2020/02/main">
                   <p202:designTagLst>
                     <p202:designTag name="ARCH:1:CLS" val="InformationBlock"/>
                     <p202:designTag name="ARCH:1:VSVAR" val="TitledTextBox"/>
@@ -15416,7 +15414,7 @@
                 <a16:creationId xmlns:a16="http://schemas.microsoft.com/office/drawing/2014/main" id="{5E8D3B17-7638-DFD3-18E4-8A6D611749CF}"/>
               </a:ext>
               <a:ext uri="{C183D7F6-B498-43B3-948B-1728B52AA6E4}">
-                <adec:decorative xmlns:adec="http://schemas.microsoft.com/office/drawing/2017/decorative" xmlns="" val="1"/>
+                <adec:decorative xmlns="" xmlns:adec="http://schemas.microsoft.com/office/drawing/2017/decorative" val="1"/>
               </a:ext>
             </a:extLst>
           </p:cNvPr>
@@ -15576,7 +15574,7 @@
                 <a16:creationId xmlns:a16="http://schemas.microsoft.com/office/drawing/2014/main" id="{5E8D3B17-7638-DFD3-18E4-8A6D611749CF}"/>
               </a:ext>
               <a:ext uri="{C183D7F6-B498-43B3-948B-1728B52AA6E4}">
-                <adec:decorative xmlns:adec="http://schemas.microsoft.com/office/drawing/2017/decorative" xmlns="" val="1"/>
+                <adec:decorative xmlns="" xmlns:adec="http://schemas.microsoft.com/office/drawing/2017/decorative" val="1"/>
               </a:ext>
             </a:extLst>
           </p:cNvPr>
@@ -15820,7 +15818,7 @@
                 <a16:creationId xmlns:a16="http://schemas.microsoft.com/office/drawing/2014/main" id="{5E8D3B17-7638-DFD3-18E4-8A6D611749CF}"/>
               </a:ext>
               <a:ext uri="{C183D7F6-B498-43B3-948B-1728B52AA6E4}">
-                <adec:decorative xmlns:adec="http://schemas.microsoft.com/office/drawing/2017/decorative" xmlns="" val="1"/>
+                <adec:decorative xmlns="" xmlns:adec="http://schemas.microsoft.com/office/drawing/2017/decorative" val="1"/>
               </a:ext>
             </a:extLst>
           </p:cNvPr>
@@ -16832,7 +16830,7 @@
                 <a16:creationId xmlns:a16="http://schemas.microsoft.com/office/drawing/2014/main" id="{5E8D3B17-7638-DFD3-18E4-8A6D611749CF}"/>
               </a:ext>
               <a:ext uri="{C183D7F6-B498-43B3-948B-1728B52AA6E4}">
-                <adec:decorative xmlns:adec="http://schemas.microsoft.com/office/drawing/2017/decorative" xmlns="" val="1"/>
+                <adec:decorative xmlns="" xmlns:adec="http://schemas.microsoft.com/office/drawing/2017/decorative" val="1"/>
               </a:ext>
             </a:extLst>
           </p:cNvPr>
@@ -17563,7 +17561,7 @@
                 <a16:creationId xmlns:a16="http://schemas.microsoft.com/office/drawing/2014/main" id="{5E8D3B17-7638-DFD3-18E4-8A6D611749CF}"/>
               </a:ext>
               <a:ext uri="{C183D7F6-B498-43B3-948B-1728B52AA6E4}">
-                <adec:decorative xmlns:adec="http://schemas.microsoft.com/office/drawing/2017/decorative" xmlns="" val="1"/>
+                <adec:decorative xmlns="" xmlns:adec="http://schemas.microsoft.com/office/drawing/2017/decorative" val="1"/>
               </a:ext>
             </a:extLst>
           </p:cNvPr>
@@ -18430,7 +18428,7 @@
                 <a16:creationId xmlns:a16="http://schemas.microsoft.com/office/drawing/2014/main" id="{5E8D3B17-7638-DFD3-18E4-8A6D611749CF}"/>
               </a:ext>
               <a:ext uri="{C183D7F6-B498-43B3-948B-1728B52AA6E4}">
-                <adec:decorative xmlns:adec="http://schemas.microsoft.com/office/drawing/2017/decorative" xmlns="" val="1"/>
+                <adec:decorative xmlns="" xmlns:adec="http://schemas.microsoft.com/office/drawing/2017/decorative" val="1"/>
               </a:ext>
             </a:extLst>
           </p:cNvPr>
@@ -18567,7 +18565,7 @@
             <p:ph sz="half" idx="2"/>
             <p:extLst>
               <p:ext uri="{E7BDC344-281C-4309-B0C6-D0EE65EED2A8}">
-                <p202:designPr xmlns:p202="http://schemas.microsoft.com/office/powerpoint/2020/02/main" xmlns="">
+                <p202:designPr xmlns="" xmlns:p202="http://schemas.microsoft.com/office/powerpoint/2020/02/main">
                   <p202:designTagLst>
                     <p202:designTag name="ARCH:1:CLS" val="InformationBlock"/>
                     <p202:designTag name="ARCH:1:VSVAR" val="TitledTextBox"/>
@@ -18793,7 +18791,7 @@
                 <a16:creationId xmlns:a16="http://schemas.microsoft.com/office/drawing/2014/main" id="{5E8D3B17-7638-DFD3-18E4-8A6D611749CF}"/>
               </a:ext>
               <a:ext uri="{C183D7F6-B498-43B3-948B-1728B52AA6E4}">
-                <adec:decorative xmlns:adec="http://schemas.microsoft.com/office/drawing/2017/decorative" xmlns="" val="1"/>
+                <adec:decorative xmlns="" xmlns:adec="http://schemas.microsoft.com/office/drawing/2017/decorative" val="1"/>
               </a:ext>
             </a:extLst>
           </p:cNvPr>
@@ -18920,7 +18918,7 @@
             <p:ph sz="half" idx="2"/>
             <p:extLst>
               <p:ext uri="{E7BDC344-281C-4309-B0C6-D0EE65EED2A8}">
-                <p202:designPr xmlns:p202="http://schemas.microsoft.com/office/powerpoint/2020/02/main" xmlns="">
+                <p202:designPr xmlns="" xmlns:p202="http://schemas.microsoft.com/office/powerpoint/2020/02/main">
                   <p202:designTagLst>
                     <p202:designTag name="ARCH:1:CLS" val="InformationBlock"/>
                     <p202:designTag name="ARCH:1:VSVAR" val="TitledTextBox"/>
@@ -19237,7 +19235,7 @@
                 <a16:creationId xmlns:a16="http://schemas.microsoft.com/office/drawing/2014/main" id="{E1D40FB4-97DC-F5FF-9E7A-C10E078A1532}"/>
               </a:ext>
               <a:ext uri="{C183D7F6-B498-43B3-948B-1728B52AA6E4}">
-                <adec:decorative xmlns:adec="http://schemas.microsoft.com/office/drawing/2017/decorative" xmlns="" val="1"/>
+                <adec:decorative xmlns="" xmlns:adec="http://schemas.microsoft.com/office/drawing/2017/decorative" val="1"/>
               </a:ext>
             </a:extLst>
           </p:cNvPr>
@@ -19367,7 +19365,7 @@
             <p:ph sz="half" idx="2"/>
             <p:extLst>
               <p:ext uri="{E7BDC344-281C-4309-B0C6-D0EE65EED2A8}">
-                <p202:designPr xmlns:p202="http://schemas.microsoft.com/office/powerpoint/2020/02/main" xmlns="">
+                <p202:designPr xmlns="" xmlns:p202="http://schemas.microsoft.com/office/powerpoint/2020/02/main">
                   <p202:designTagLst>
                     <p202:designTag name="ARCH:1:CLS" val="InformationBlock"/>
                     <p202:designTag name="ARCH:1:VSVAR" val="TitledTextBox"/>
@@ -19625,7 +19623,7 @@
                 <a16:creationId xmlns:a16="http://schemas.microsoft.com/office/drawing/2014/main" id="{A51D6A68-C3BD-3399-CCA8-A7290FC8E09C}"/>
               </a:ext>
               <a:ext uri="{C183D7F6-B498-43B3-948B-1728B52AA6E4}">
-                <adec:decorative xmlns:adec="http://schemas.microsoft.com/office/drawing/2017/decorative" xmlns="" val="1"/>
+                <adec:decorative xmlns="" xmlns:adec="http://schemas.microsoft.com/office/drawing/2017/decorative" val="1"/>
               </a:ext>
             </a:extLst>
           </p:cNvPr>
@@ -19753,7 +19751,7 @@
             <p:ph sz="half" idx="2"/>
             <p:extLst>
               <p:ext uri="{E7BDC344-281C-4309-B0C6-D0EE65EED2A8}">
-                <p202:designPr xmlns:p202="http://schemas.microsoft.com/office/powerpoint/2020/02/main" xmlns="">
+                <p202:designPr xmlns="" xmlns:p202="http://schemas.microsoft.com/office/powerpoint/2020/02/main">
                   <p202:designTagLst>
                     <p202:designTag name="ARCH:1:CLS" val="InformationBlock"/>
                     <p202:designTag name="ARCH:1:VSVAR" val="TitledTextBox"/>
@@ -20011,7 +20009,7 @@
                 <a16:creationId xmlns:a16="http://schemas.microsoft.com/office/drawing/2014/main" id="{7F39A533-5E9C-439F-5CF1-06FFAB778C1F}"/>
               </a:ext>
               <a:ext uri="{C183D7F6-B498-43B3-948B-1728B52AA6E4}">
-                <adec:decorative xmlns:adec="http://schemas.microsoft.com/office/drawing/2017/decorative" xmlns="" val="1"/>
+                <adec:decorative xmlns="" xmlns:adec="http://schemas.microsoft.com/office/drawing/2017/decorative" val="1"/>
               </a:ext>
             </a:extLst>
           </p:cNvPr>
@@ -20139,7 +20137,7 @@
             <p:ph sz="half" idx="2"/>
             <p:extLst>
               <p:ext uri="{E7BDC344-281C-4309-B0C6-D0EE65EED2A8}">
-                <p202:designPr xmlns:p202="http://schemas.microsoft.com/office/powerpoint/2020/02/main" xmlns="">
+                <p202:designPr xmlns="" xmlns:p202="http://schemas.microsoft.com/office/powerpoint/2020/02/main">
                   <p202:designTagLst>
                     <p202:designTag name="ARCH:1:CLS" val="InformationBlock"/>
                     <p202:designTag name="ARCH:1:VSVAR" val="TitledTextBox"/>
@@ -20412,7 +20410,7 @@
                 <a16:creationId xmlns:a16="http://schemas.microsoft.com/office/drawing/2014/main" id="{A82A2D76-411A-C189-4AD9-642686996848}"/>
               </a:ext>
               <a:ext uri="{C183D7F6-B498-43B3-948B-1728B52AA6E4}">
-                <adec:decorative xmlns:adec="http://schemas.microsoft.com/office/drawing/2017/decorative" xmlns="" val="1"/>
+                <adec:decorative xmlns="" xmlns:adec="http://schemas.microsoft.com/office/drawing/2017/decorative" val="1"/>
               </a:ext>
             </a:extLst>
           </p:cNvPr>
@@ -20540,7 +20538,7 @@
             <p:ph sz="half" idx="2"/>
             <p:extLst>
               <p:ext uri="{E7BDC344-281C-4309-B0C6-D0EE65EED2A8}">
-                <p202:designPr xmlns:p202="http://schemas.microsoft.com/office/powerpoint/2020/02/main" xmlns="">
+                <p202:designPr xmlns="" xmlns:p202="http://schemas.microsoft.com/office/powerpoint/2020/02/main">
                   <p202:designTagLst>
                     <p202:designTag name="ARCH:1:CLS" val="InformationBlock"/>
                     <p202:designTag name="ARCH:1:VSVAR" val="TitledTextBox"/>
@@ -20801,7 +20799,7 @@
                 <a16:creationId xmlns:a16="http://schemas.microsoft.com/office/drawing/2014/main" id="{E482AA53-DA69-E258-8B64-8F8CE86FCDD4}"/>
               </a:ext>
               <a:ext uri="{C183D7F6-B498-43B3-948B-1728B52AA6E4}">
-                <adec:decorative xmlns:adec="http://schemas.microsoft.com/office/drawing/2017/decorative" xmlns="" val="1"/>
+                <adec:decorative xmlns="" xmlns:adec="http://schemas.microsoft.com/office/drawing/2017/decorative" val="1"/>
               </a:ext>
             </a:extLst>
           </p:cNvPr>
@@ -20929,7 +20927,7 @@
             <p:ph sz="half" idx="2"/>
             <p:extLst>
               <p:ext uri="{E7BDC344-281C-4309-B0C6-D0EE65EED2A8}">
-                <p202:designPr xmlns:p202="http://schemas.microsoft.com/office/powerpoint/2020/02/main" xmlns="">
+                <p202:designPr xmlns="" xmlns:p202="http://schemas.microsoft.com/office/powerpoint/2020/02/main">
                   <p202:designTagLst>
                     <p202:designTag name="ARCH:1:CLS" val="InformationBlock"/>
                     <p202:designTag name="ARCH:1:VSVAR" val="TitledTextBox"/>
@@ -21205,7 +21203,7 @@
                 <a16:creationId xmlns:a16="http://schemas.microsoft.com/office/drawing/2014/main" id="{5C27E16A-554C-D4AC-900E-AA69DDAEDE03}"/>
               </a:ext>
               <a:ext uri="{C183D7F6-B498-43B3-948B-1728B52AA6E4}">
-                <adec:decorative xmlns:adec="http://schemas.microsoft.com/office/drawing/2017/decorative" xmlns="" val="1"/>
+                <adec:decorative xmlns="" xmlns:adec="http://schemas.microsoft.com/office/drawing/2017/decorative" val="1"/>
               </a:ext>
             </a:extLst>
           </p:cNvPr>
@@ -21333,7 +21331,7 @@
             <p:ph sz="half" idx="2"/>
             <p:extLst>
               <p:ext uri="{E7BDC344-281C-4309-B0C6-D0EE65EED2A8}">
-                <p202:designPr xmlns:p202="http://schemas.microsoft.com/office/powerpoint/2020/02/main" xmlns="">
+                <p202:designPr xmlns="" xmlns:p202="http://schemas.microsoft.com/office/powerpoint/2020/02/main">
                   <p202:designTagLst>
                     <p202:designTag name="ARCH:1:CLS" val="InformationBlock"/>
                     <p202:designTag name="ARCH:1:VSVAR" val="TitledTextBox"/>

</xml_diff>